<commit_message>
Created an instructional video, further updates to documentation and presentation
</commit_message>
<xml_diff>
--- a/Documentation/Final Project Documentation/SD6501_FinalProject_Presentation_MDuToit.pptx
+++ b/Documentation/Final Project Documentation/SD6501_FinalProject_Presentation_MDuToit.pptx
@@ -12742,7 +12742,7 @@
             </a:pPr>
             <a:r>
               <a:rPr lang="en-US" dirty="0"/>
-              <a:t>Login</a:t>
+              <a:t>Register and Login</a:t>
             </a:r>
           </a:p>
           <a:p>
@@ -12751,14 +12751,26 @@
             </a:pPr>
             <a:r>
               <a:rPr lang="en-US" dirty="0"/>
-              <a:t>Store users, transactions and accounts to database</a:t>
+              <a:t>Create and Update Accounts</a:t>
             </a:r>
           </a:p>
           <a:p>
             <a:pPr marL="0" indent="0">
               <a:buNone/>
             </a:pPr>
-            <a:endParaRPr lang="en-US" dirty="0"/>
+            <a:r>
+              <a:rPr lang="en-US" dirty="0"/>
+              <a:t>Create and Update Transactions</a:t>
+            </a:r>
+          </a:p>
+          <a:p>
+            <a:pPr marL="0" indent="0">
+              <a:buNone/>
+            </a:pPr>
+            <a:r>
+              <a:rPr lang="en-US" dirty="0"/>
+              <a:t>View all recorded Transactions</a:t>
+            </a:r>
           </a:p>
         </p:txBody>
       </p:sp>
@@ -12778,6 +12790,30 @@
 <file path=ppt/slides/slide4.xml><?xml version="1.0" encoding="utf-8"?>
 <p:sld xmlns:a="http://schemas.openxmlformats.org/drawingml/2006/main" xmlns:r="http://schemas.openxmlformats.org/officeDocument/2006/relationships" xmlns:p="http://schemas.openxmlformats.org/presentationml/2006/main">
   <p:cSld>
+    <p:bg>
+      <p:bgPr>
+        <a:blipFill>
+          <a:blip r:embed="rId2">
+            <a:duotone>
+              <a:schemeClr val="bg2">
+                <a:shade val="88000"/>
+                <a:hueMod val="106000"/>
+                <a:satMod val="140000"/>
+                <a:lumMod val="54000"/>
+              </a:schemeClr>
+              <a:schemeClr val="bg2">
+                <a:tint val="98000"/>
+                <a:hueMod val="90000"/>
+                <a:satMod val="150000"/>
+                <a:lumMod val="160000"/>
+              </a:schemeClr>
+            </a:duotone>
+          </a:blip>
+          <a:stretch/>
+        </a:blipFill>
+        <a:effectLst/>
+      </p:bgPr>
+    </p:bg>
     <p:spTree>
       <p:nvGrpSpPr>
         <p:cNvPr id="1" name=""/>
@@ -12808,9 +12844,16 @@
             <p:ph type="title"/>
           </p:nvPr>
         </p:nvSpPr>
-        <p:spPr/>
+        <p:spPr>
+          <a:xfrm>
+            <a:off x="1141413" y="618518"/>
+            <a:ext cx="4685529" cy="1478570"/>
+          </a:xfrm>
+        </p:spPr>
         <p:txBody>
-          <a:bodyPr/>
+          <a:bodyPr>
+            <a:normAutofit/>
+          </a:bodyPr>
           <a:lstStyle/>
           <a:p>
             <a:r>
@@ -12837,16 +12880,23 @@
             <p:ph idx="1"/>
           </p:nvPr>
         </p:nvSpPr>
-        <p:spPr/>
+        <p:spPr>
+          <a:xfrm>
+            <a:off x="1141413" y="2249487"/>
+            <a:ext cx="4685530" cy="3541714"/>
+          </a:xfrm>
+        </p:spPr>
         <p:txBody>
-          <a:bodyPr/>
+          <a:bodyPr>
+            <a:normAutofit/>
+          </a:bodyPr>
           <a:lstStyle/>
           <a:p>
             <a:pPr marL="0" indent="0">
               <a:buNone/>
             </a:pPr>
             <a:r>
-              <a:rPr lang="en-US" dirty="0"/>
+              <a:rPr lang="en-US" sz="2300" dirty="0"/>
               <a:t>Biometric Login</a:t>
             </a:r>
           </a:p>
@@ -12855,7 +12905,7 @@
               <a:buNone/>
             </a:pPr>
             <a:r>
-              <a:rPr lang="en-US" dirty="0"/>
+              <a:rPr lang="en-US" sz="2300" dirty="0"/>
               <a:t>Navigation Drawer</a:t>
             </a:r>
           </a:p>
@@ -12864,7 +12914,7 @@
               <a:buNone/>
             </a:pPr>
             <a:r>
-              <a:rPr lang="en-US" dirty="0"/>
+              <a:rPr lang="en-US" sz="2300" dirty="0"/>
               <a:t>Floating Action Button</a:t>
             </a:r>
           </a:p>
@@ -12873,7 +12923,7 @@
               <a:buNone/>
             </a:pPr>
             <a:r>
-              <a:rPr lang="en-US" dirty="0"/>
+              <a:rPr lang="en-US" sz="2300" dirty="0"/>
               <a:t>Custom Spinners &amp; List Views</a:t>
             </a:r>
           </a:p>
@@ -12882,21 +12932,351 @@
               <a:buNone/>
             </a:pPr>
             <a:r>
-              <a:rPr lang="en-US" dirty="0"/>
+              <a:rPr lang="en-US" sz="2300" dirty="0"/>
               <a:t>Tabbed Layout, </a:t>
             </a:r>
             <a:r>
-              <a:rPr lang="en-US" dirty="0" err="1"/>
+              <a:rPr lang="en-US" sz="2300" dirty="0" err="1"/>
               <a:t>ViewPager</a:t>
             </a:r>
             <a:r>
-              <a:rPr lang="en-US" dirty="0"/>
+              <a:rPr lang="en-US" sz="2300" dirty="0"/>
               <a:t> &amp; Fragments</a:t>
             </a:r>
-            <a:endParaRPr lang="en-NZ" dirty="0"/>
+            <a:endParaRPr lang="en-NZ" sz="2300" dirty="0"/>
           </a:p>
         </p:txBody>
       </p:sp>
+      <p:sp>
+        <p:nvSpPr>
+          <p:cNvPr id="18" name="Rectangle 17">
+            <a:extLst>
+              <a:ext uri="{FF2B5EF4-FFF2-40B4-BE49-F238E27FC236}">
+                <a16:creationId xmlns:a16="http://schemas.microsoft.com/office/drawing/2014/main" id="{F30A76D5-D2C2-49EE-9318-901F395085AB}"/>
+              </a:ext>
+              <a:ext uri="{C183D7F6-B498-43B3-948B-1728B52AA6E4}">
+                <adec:decorative xmlns:adec="http://schemas.microsoft.com/office/drawing/2017/decorative" val="1"/>
+              </a:ext>
+            </a:extLst>
+          </p:cNvPr>
+          <p:cNvSpPr>
+            <a:spLocks noGrp="1" noRot="1" noChangeAspect="1" noMove="1" noResize="1" noEditPoints="1" noAdjustHandles="1" noChangeArrowheads="1" noChangeShapeType="1" noTextEdit="1"/>
+          </p:cNvSpPr>
+          <p:nvPr>
+            <p:extLst>
+              <p:ext uri="{386F3935-93C4-4BCD-93E2-E3B085C9AB24}">
+                <p16:designElem xmlns:p16="http://schemas.microsoft.com/office/powerpoint/2015/main" val="1"/>
+              </p:ext>
+            </p:extLst>
+          </p:nvPr>
+        </p:nvSpPr>
+        <p:spPr>
+          <a:xfrm>
+            <a:off x="6095999" y="0"/>
+            <a:ext cx="6096001" cy="6858000"/>
+          </a:xfrm>
+          <a:prstGeom prst="rect">
+            <a:avLst/>
+          </a:prstGeom>
+          <a:solidFill>
+            <a:schemeClr val="tx1"/>
+          </a:solidFill>
+          <a:ln>
+            <a:noFill/>
+          </a:ln>
+          <a:effectLst>
+            <a:innerShdw blurRad="63500" dist="12700" dir="10800000">
+              <a:prstClr val="black">
+                <a:alpha val="42000"/>
+              </a:prstClr>
+            </a:innerShdw>
+          </a:effectLst>
+        </p:spPr>
+        <p:style>
+          <a:lnRef idx="2">
+            <a:schemeClr val="accent1">
+              <a:shade val="50000"/>
+            </a:schemeClr>
+          </a:lnRef>
+          <a:fillRef idx="1">
+            <a:schemeClr val="accent1"/>
+          </a:fillRef>
+          <a:effectRef idx="0">
+            <a:schemeClr val="accent1"/>
+          </a:effectRef>
+          <a:fontRef idx="minor">
+            <a:schemeClr val="lt1"/>
+          </a:fontRef>
+        </p:style>
+        <p:txBody>
+          <a:bodyPr rtlCol="0" anchor="ctr"/>
+          <a:lstStyle/>
+          <a:p>
+            <a:pPr algn="ctr"/>
+            <a:endParaRPr lang="en-US"/>
+          </a:p>
+        </p:txBody>
+      </p:sp>
+      <p:pic>
+        <p:nvPicPr>
+          <p:cNvPr id="5" name="Picture 4" descr="Graphical user interface, application, Teams&#10;&#10;Description automatically generated">
+            <a:extLst>
+              <a:ext uri="{FF2B5EF4-FFF2-40B4-BE49-F238E27FC236}">
+                <a16:creationId xmlns:a16="http://schemas.microsoft.com/office/drawing/2014/main" id="{86F5CAC1-7D1C-4A48-896B-DEE322A3641E}"/>
+              </a:ext>
+            </a:extLst>
+          </p:cNvPr>
+          <p:cNvPicPr>
+            <a:picLocks noChangeAspect="1"/>
+          </p:cNvPicPr>
+          <p:nvPr/>
+        </p:nvPicPr>
+        <p:blipFill rotWithShape="1">
+          <a:blip r:embed="rId3">
+            <a:extLst>
+              <a:ext uri="{28A0092B-C50C-407E-A947-70E740481C1C}">
+                <a14:useLocalDpi xmlns:a14="http://schemas.microsoft.com/office/drawing/2010/main" val="0"/>
+              </a:ext>
+            </a:extLst>
+          </a:blip>
+          <a:srcRect t="3972" b="6950"/>
+          <a:stretch/>
+        </p:blipFill>
+        <p:spPr>
+          <a:xfrm>
+            <a:off x="6735055" y="321734"/>
+            <a:ext cx="1730107" cy="2739814"/>
+          </a:xfrm>
+          <a:prstGeom prst="rect">
+            <a:avLst/>
+          </a:prstGeom>
+        </p:spPr>
+      </p:pic>
+      <p:sp useBgFill="1">
+        <p:nvSpPr>
+          <p:cNvPr id="20" name="Rectangle 19">
+            <a:extLst>
+              <a:ext uri="{FF2B5EF4-FFF2-40B4-BE49-F238E27FC236}">
+                <a16:creationId xmlns:a16="http://schemas.microsoft.com/office/drawing/2014/main" id="{8D3D1BB4-141F-47BF-8854-E25124A467D4}"/>
+              </a:ext>
+              <a:ext uri="{C183D7F6-B498-43B3-948B-1728B52AA6E4}">
+                <adec:decorative xmlns:adec="http://schemas.microsoft.com/office/drawing/2017/decorative" val="1"/>
+              </a:ext>
+            </a:extLst>
+          </p:cNvPr>
+          <p:cNvSpPr>
+            <a:spLocks noGrp="1" noRot="1" noChangeAspect="1" noMove="1" noResize="1" noEditPoints="1" noAdjustHandles="1" noChangeArrowheads="1" noChangeShapeType="1" noTextEdit="1"/>
+          </p:cNvSpPr>
+          <p:nvPr>
+            <p:extLst>
+              <p:ext uri="{386F3935-93C4-4BCD-93E2-E3B085C9AB24}">
+                <p16:designElem xmlns:p16="http://schemas.microsoft.com/office/powerpoint/2015/main" val="1"/>
+              </p:ext>
+            </p:extLst>
+          </p:nvPr>
+        </p:nvSpPr>
+        <p:spPr>
+          <a:xfrm>
+            <a:off x="6093041" y="3383280"/>
+            <a:ext cx="6096002" cy="91440"/>
+          </a:xfrm>
+          <a:prstGeom prst="rect">
+            <a:avLst/>
+          </a:prstGeom>
+          <a:ln>
+            <a:noFill/>
+          </a:ln>
+        </p:spPr>
+        <p:style>
+          <a:lnRef idx="2">
+            <a:schemeClr val="accent1">
+              <a:shade val="50000"/>
+            </a:schemeClr>
+          </a:lnRef>
+          <a:fillRef idx="1">
+            <a:schemeClr val="accent1"/>
+          </a:fillRef>
+          <a:effectRef idx="0">
+            <a:schemeClr val="accent1"/>
+          </a:effectRef>
+          <a:fontRef idx="minor">
+            <a:schemeClr val="lt1"/>
+          </a:fontRef>
+        </p:style>
+        <p:txBody>
+          <a:bodyPr rtlCol="0" anchor="ctr"/>
+          <a:lstStyle/>
+          <a:p>
+            <a:pPr algn="ctr"/>
+            <a:endParaRPr lang="en-US"/>
+          </a:p>
+        </p:txBody>
+      </p:sp>
+      <p:sp useBgFill="1">
+        <p:nvSpPr>
+          <p:cNvPr id="22" name="Rectangle 21">
+            <a:extLst>
+              <a:ext uri="{FF2B5EF4-FFF2-40B4-BE49-F238E27FC236}">
+                <a16:creationId xmlns:a16="http://schemas.microsoft.com/office/drawing/2014/main" id="{FC2226AF-C533-4D07-8B21-C9D8BF14D64E}"/>
+              </a:ext>
+              <a:ext uri="{C183D7F6-B498-43B3-948B-1728B52AA6E4}">
+                <adec:decorative xmlns:adec="http://schemas.microsoft.com/office/drawing/2017/decorative" val="1"/>
+              </a:ext>
+            </a:extLst>
+          </p:cNvPr>
+          <p:cNvSpPr>
+            <a:spLocks noGrp="1" noRot="1" noChangeAspect="1" noMove="1" noResize="1" noEditPoints="1" noAdjustHandles="1" noChangeArrowheads="1" noChangeShapeType="1" noTextEdit="1"/>
+          </p:cNvSpPr>
+          <p:nvPr>
+            <p:extLst>
+              <p:ext uri="{386F3935-93C4-4BCD-93E2-E3B085C9AB24}">
+                <p16:designElem xmlns:p16="http://schemas.microsoft.com/office/powerpoint/2015/main" val="1"/>
+              </p:ext>
+            </p:extLst>
+          </p:nvPr>
+        </p:nvSpPr>
+        <p:spPr>
+          <a:xfrm>
+            <a:off x="9095322" y="0"/>
+            <a:ext cx="91440" cy="6858000"/>
+          </a:xfrm>
+          <a:prstGeom prst="rect">
+            <a:avLst/>
+          </a:prstGeom>
+          <a:ln>
+            <a:noFill/>
+          </a:ln>
+        </p:spPr>
+        <p:style>
+          <a:lnRef idx="2">
+            <a:schemeClr val="accent1">
+              <a:shade val="50000"/>
+            </a:schemeClr>
+          </a:lnRef>
+          <a:fillRef idx="1">
+            <a:schemeClr val="accent1"/>
+          </a:fillRef>
+          <a:effectRef idx="0">
+            <a:schemeClr val="accent1"/>
+          </a:effectRef>
+          <a:fontRef idx="minor">
+            <a:schemeClr val="lt1"/>
+          </a:fontRef>
+        </p:style>
+        <p:txBody>
+          <a:bodyPr rtlCol="0" anchor="ctr"/>
+          <a:lstStyle/>
+          <a:p>
+            <a:pPr algn="ctr"/>
+            <a:endParaRPr lang="en-US"/>
+          </a:p>
+        </p:txBody>
+      </p:sp>
+      <p:pic>
+        <p:nvPicPr>
+          <p:cNvPr id="11" name="Picture 10" descr="Graphical user interface, application&#10;&#10;Description automatically generated">
+            <a:extLst>
+              <a:ext uri="{FF2B5EF4-FFF2-40B4-BE49-F238E27FC236}">
+                <a16:creationId xmlns:a16="http://schemas.microsoft.com/office/drawing/2014/main" id="{3D62F3CF-C0DD-47CB-AD4C-355CD164F1AE}"/>
+              </a:ext>
+            </a:extLst>
+          </p:cNvPr>
+          <p:cNvPicPr>
+            <a:picLocks noChangeAspect="1"/>
+          </p:cNvPicPr>
+          <p:nvPr/>
+        </p:nvPicPr>
+        <p:blipFill rotWithShape="1">
+          <a:blip r:embed="rId4">
+            <a:extLst>
+              <a:ext uri="{28A0092B-C50C-407E-A947-70E740481C1C}">
+                <a14:useLocalDpi xmlns:a14="http://schemas.microsoft.com/office/drawing/2010/main" val="0"/>
+              </a:ext>
+            </a:extLst>
+          </a:blip>
+          <a:srcRect t="3299" b="7217"/>
+          <a:stretch/>
+        </p:blipFill>
+        <p:spPr>
+          <a:xfrm>
+            <a:off x="9820847" y="321734"/>
+            <a:ext cx="1722257" cy="2739814"/>
+          </a:xfrm>
+          <a:prstGeom prst="rect">
+            <a:avLst/>
+          </a:prstGeom>
+        </p:spPr>
+      </p:pic>
+      <p:pic>
+        <p:nvPicPr>
+          <p:cNvPr id="13" name="Picture 12" descr="Graphical user interface, application, Teams&#10;&#10;Description automatically generated">
+            <a:extLst>
+              <a:ext uri="{FF2B5EF4-FFF2-40B4-BE49-F238E27FC236}">
+                <a16:creationId xmlns:a16="http://schemas.microsoft.com/office/drawing/2014/main" id="{2806B5B5-C864-4D00-A8B6-74F2D75B86A0}"/>
+              </a:ext>
+            </a:extLst>
+          </p:cNvPr>
+          <p:cNvPicPr>
+            <a:picLocks noChangeAspect="1"/>
+          </p:cNvPicPr>
+          <p:nvPr/>
+        </p:nvPicPr>
+        <p:blipFill rotWithShape="1">
+          <a:blip r:embed="rId5">
+            <a:extLst>
+              <a:ext uri="{28A0092B-C50C-407E-A947-70E740481C1C}">
+                <a14:useLocalDpi xmlns:a14="http://schemas.microsoft.com/office/drawing/2010/main" val="0"/>
+              </a:ext>
+            </a:extLst>
+          </a:blip>
+          <a:srcRect t="3546" b="6950"/>
+          <a:stretch/>
+        </p:blipFill>
+        <p:spPr>
+          <a:xfrm>
+            <a:off x="6829536" y="3796452"/>
+            <a:ext cx="1541145" cy="2739814"/>
+          </a:xfrm>
+          <a:prstGeom prst="rect">
+            <a:avLst/>
+          </a:prstGeom>
+        </p:spPr>
+      </p:pic>
+      <p:pic>
+        <p:nvPicPr>
+          <p:cNvPr id="7" name="Picture 6" descr="Text, table&#10;&#10;Description automatically generated with medium confidence">
+            <a:extLst>
+              <a:ext uri="{FF2B5EF4-FFF2-40B4-BE49-F238E27FC236}">
+                <a16:creationId xmlns:a16="http://schemas.microsoft.com/office/drawing/2014/main" id="{C7A3EBAA-6440-4BD6-8ECC-E09D430A1446}"/>
+              </a:ext>
+            </a:extLst>
+          </p:cNvPr>
+          <p:cNvPicPr>
+            <a:picLocks noChangeAspect="1"/>
+          </p:cNvPicPr>
+          <p:nvPr/>
+        </p:nvPicPr>
+        <p:blipFill rotWithShape="1">
+          <a:blip r:embed="rId6">
+            <a:extLst>
+              <a:ext uri="{28A0092B-C50C-407E-A947-70E740481C1C}">
+                <a14:useLocalDpi xmlns:a14="http://schemas.microsoft.com/office/drawing/2010/main" val="0"/>
+              </a:ext>
+            </a:extLst>
+          </a:blip>
+          <a:srcRect l="77534" t="78614" b="6667"/>
+          <a:stretch/>
+        </p:blipFill>
+        <p:spPr>
+          <a:xfrm>
+            <a:off x="9505829" y="3796452"/>
+            <a:ext cx="2352293" cy="2739814"/>
+          </a:xfrm>
+          <a:prstGeom prst="rect">
+            <a:avLst/>
+          </a:prstGeom>
+        </p:spPr>
+      </p:pic>
     </p:spTree>
     <p:extLst>
       <p:ext uri="{BB962C8B-B14F-4D97-AF65-F5344CB8AC3E}">
@@ -12956,31 +13336,110 @@
           </a:p>
         </p:txBody>
       </p:sp>
-      <p:sp>
-        <p:nvSpPr>
-          <p:cNvPr id="3" name="Content Placeholder 2">
+      <p:pic>
+        <p:nvPicPr>
+          <p:cNvPr id="5" name="Content Placeholder 4" descr="Graphical user interface, application&#10;&#10;Description automatically generated">
             <a:extLst>
               <a:ext uri="{FF2B5EF4-FFF2-40B4-BE49-F238E27FC236}">
-                <a16:creationId xmlns:a16="http://schemas.microsoft.com/office/drawing/2014/main" id="{1107B0CB-24A8-4559-9065-1271EDAA5844}"/>
+                <a16:creationId xmlns:a16="http://schemas.microsoft.com/office/drawing/2014/main" id="{E2389A3E-3909-497F-87C9-D5E455B2F39A}"/>
               </a:ext>
             </a:extLst>
           </p:cNvPr>
-          <p:cNvSpPr>
-            <a:spLocks noGrp="1"/>
-          </p:cNvSpPr>
+          <p:cNvPicPr>
+            <a:picLocks noGrp="1" noChangeAspect="1"/>
+          </p:cNvPicPr>
           <p:nvPr>
             <p:ph idx="1"/>
           </p:nvPr>
-        </p:nvSpPr>
-        <p:spPr/>
-        <p:txBody>
-          <a:bodyPr/>
-          <a:lstStyle/>
-          <a:p>
-            <a:endParaRPr lang="en-NZ" dirty="0"/>
-          </a:p>
-        </p:txBody>
-      </p:sp>
+        </p:nvPicPr>
+        <p:blipFill rotWithShape="1">
+          <a:blip r:embed="rId2">
+            <a:extLst>
+              <a:ext uri="{28A0092B-C50C-407E-A947-70E740481C1C}">
+                <a14:useLocalDpi xmlns:a14="http://schemas.microsoft.com/office/drawing/2010/main" val="0"/>
+              </a:ext>
+            </a:extLst>
+          </a:blip>
+          <a:srcRect t="3704" b="6714"/>
+          <a:stretch/>
+        </p:blipFill>
+        <p:spPr>
+          <a:xfrm>
+            <a:off x="7637957" y="1899124"/>
+            <a:ext cx="2685870" cy="4277448"/>
+          </a:xfrm>
+        </p:spPr>
+      </p:pic>
+      <p:pic>
+        <p:nvPicPr>
+          <p:cNvPr id="7" name="Picture 6" descr="Graphical user interface&#10;&#10;Description automatically generated">
+            <a:extLst>
+              <a:ext uri="{FF2B5EF4-FFF2-40B4-BE49-F238E27FC236}">
+                <a16:creationId xmlns:a16="http://schemas.microsoft.com/office/drawing/2014/main" id="{24255E2C-8C9D-418C-BAA8-61B7E759F08E}"/>
+              </a:ext>
+            </a:extLst>
+          </p:cNvPr>
+          <p:cNvPicPr>
+            <a:picLocks noChangeAspect="1"/>
+          </p:cNvPicPr>
+          <p:nvPr/>
+        </p:nvPicPr>
+        <p:blipFill rotWithShape="1">
+          <a:blip r:embed="rId3">
+            <a:extLst>
+              <a:ext uri="{28A0092B-C50C-407E-A947-70E740481C1C}">
+                <a14:useLocalDpi xmlns:a14="http://schemas.microsoft.com/office/drawing/2010/main" val="0"/>
+              </a:ext>
+            </a:extLst>
+          </a:blip>
+          <a:srcRect t="3267" b="6918"/>
+          <a:stretch/>
+        </p:blipFill>
+        <p:spPr>
+          <a:xfrm>
+            <a:off x="4356691" y="1899125"/>
+            <a:ext cx="2685870" cy="4288545"/>
+          </a:xfrm>
+          <a:prstGeom prst="rect">
+            <a:avLst/>
+          </a:prstGeom>
+        </p:spPr>
+      </p:pic>
+      <p:pic>
+        <p:nvPicPr>
+          <p:cNvPr id="9" name="Picture 8" descr="Graphical user interface, application, Teams&#10;&#10;Description automatically generated">
+            <a:extLst>
+              <a:ext uri="{FF2B5EF4-FFF2-40B4-BE49-F238E27FC236}">
+                <a16:creationId xmlns:a16="http://schemas.microsoft.com/office/drawing/2014/main" id="{22D0C6D0-BC32-4707-B20B-2546C6CB9F6E}"/>
+              </a:ext>
+            </a:extLst>
+          </p:cNvPr>
+          <p:cNvPicPr>
+            <a:picLocks noChangeAspect="1"/>
+          </p:cNvPicPr>
+          <p:nvPr/>
+        </p:nvPicPr>
+        <p:blipFill rotWithShape="1">
+          <a:blip r:embed="rId4">
+            <a:extLst>
+              <a:ext uri="{28A0092B-C50C-407E-A947-70E740481C1C}">
+                <a14:useLocalDpi xmlns:a14="http://schemas.microsoft.com/office/drawing/2010/main" val="0"/>
+              </a:ext>
+            </a:extLst>
+          </a:blip>
+          <a:srcRect t="3491" b="7442"/>
+          <a:stretch/>
+        </p:blipFill>
+        <p:spPr>
+          <a:xfrm>
+            <a:off x="1075425" y="1899125"/>
+            <a:ext cx="2685870" cy="4252803"/>
+          </a:xfrm>
+          <a:prstGeom prst="rect">
+            <a:avLst/>
+          </a:prstGeom>
+        </p:spPr>
+      </p:pic>
     </p:spTree>
     <p:extLst>
       <p:ext uri="{BB962C8B-B14F-4D97-AF65-F5344CB8AC3E}">
@@ -13040,31 +13499,75 @@
           </a:p>
         </p:txBody>
       </p:sp>
-      <p:sp>
-        <p:nvSpPr>
-          <p:cNvPr id="3" name="Content Placeholder 2">
+      <p:pic>
+        <p:nvPicPr>
+          <p:cNvPr id="5" name="Content Placeholder 4" descr="Graphical user interface, application, Teams&#10;&#10;Description automatically generated">
             <a:extLst>
               <a:ext uri="{FF2B5EF4-FFF2-40B4-BE49-F238E27FC236}">
-                <a16:creationId xmlns:a16="http://schemas.microsoft.com/office/drawing/2014/main" id="{4E7A2721-AA97-4022-89B0-AA9F2BA29A99}"/>
+                <a16:creationId xmlns:a16="http://schemas.microsoft.com/office/drawing/2014/main" id="{69F34467-4D7C-4DE2-9FE3-6C43DB1F8EA1}"/>
               </a:ext>
             </a:extLst>
           </p:cNvPr>
-          <p:cNvSpPr>
-            <a:spLocks noGrp="1"/>
-          </p:cNvSpPr>
+          <p:cNvPicPr>
+            <a:picLocks noGrp="1" noChangeAspect="1"/>
+          </p:cNvPicPr>
           <p:nvPr>
             <p:ph idx="1"/>
           </p:nvPr>
-        </p:nvSpPr>
-        <p:spPr/>
-        <p:txBody>
-          <a:bodyPr/>
-          <a:lstStyle/>
-          <a:p>
-            <a:endParaRPr lang="en-NZ"/>
-          </a:p>
-        </p:txBody>
-      </p:sp>
+        </p:nvPicPr>
+        <p:blipFill rotWithShape="1">
+          <a:blip r:embed="rId2">
+            <a:extLst>
+              <a:ext uri="{28A0092B-C50C-407E-A947-70E740481C1C}">
+                <a14:useLocalDpi xmlns:a14="http://schemas.microsoft.com/office/drawing/2010/main" val="0"/>
+              </a:ext>
+            </a:extLst>
+          </a:blip>
+          <a:srcRect t="4328" b="7232"/>
+          <a:stretch/>
+        </p:blipFill>
+        <p:spPr>
+          <a:xfrm>
+            <a:off x="4602196" y="1750978"/>
+            <a:ext cx="2716315" cy="4270793"/>
+          </a:xfrm>
+        </p:spPr>
+      </p:pic>
+      <p:pic>
+        <p:nvPicPr>
+          <p:cNvPr id="7" name="Picture 6" descr="Graphical user interface, application, Teams&#10;&#10;Description automatically generated">
+            <a:extLst>
+              <a:ext uri="{FF2B5EF4-FFF2-40B4-BE49-F238E27FC236}">
+                <a16:creationId xmlns:a16="http://schemas.microsoft.com/office/drawing/2014/main" id="{2BF42F5C-52BB-4812-854A-4EB7CD3549B0}"/>
+              </a:ext>
+            </a:extLst>
+          </p:cNvPr>
+          <p:cNvPicPr>
+            <a:picLocks noChangeAspect="1"/>
+          </p:cNvPicPr>
+          <p:nvPr/>
+        </p:nvPicPr>
+        <p:blipFill rotWithShape="1">
+          <a:blip r:embed="rId3">
+            <a:extLst>
+              <a:ext uri="{28A0092B-C50C-407E-A947-70E740481C1C}">
+                <a14:useLocalDpi xmlns:a14="http://schemas.microsoft.com/office/drawing/2010/main" val="0"/>
+              </a:ext>
+            </a:extLst>
+          </a:blip>
+          <a:srcRect t="3223" b="8142"/>
+          <a:stretch/>
+        </p:blipFill>
+        <p:spPr>
+          <a:xfrm>
+            <a:off x="1223791" y="1750979"/>
+            <a:ext cx="2716315" cy="4280171"/>
+          </a:xfrm>
+          <a:prstGeom prst="rect">
+            <a:avLst/>
+          </a:prstGeom>
+        </p:spPr>
+      </p:pic>
     </p:spTree>
     <p:extLst>
       <p:ext uri="{BB962C8B-B14F-4D97-AF65-F5344CB8AC3E}">
@@ -13124,31 +13627,75 @@
           </a:p>
         </p:txBody>
       </p:sp>
-      <p:sp>
-        <p:nvSpPr>
-          <p:cNvPr id="3" name="Content Placeholder 2">
+      <p:pic>
+        <p:nvPicPr>
+          <p:cNvPr id="5" name="Content Placeholder 4" descr="Graphical user interface&#10;&#10;Description automatically generated with medium confidence">
             <a:extLst>
               <a:ext uri="{FF2B5EF4-FFF2-40B4-BE49-F238E27FC236}">
-                <a16:creationId xmlns:a16="http://schemas.microsoft.com/office/drawing/2014/main" id="{F910AE0F-D116-4D4D-9182-D30FA4DC80CF}"/>
+                <a16:creationId xmlns:a16="http://schemas.microsoft.com/office/drawing/2014/main" id="{00D07407-817F-4CE8-838E-65A9F9B2A279}"/>
               </a:ext>
             </a:extLst>
           </p:cNvPr>
-          <p:cNvSpPr>
-            <a:spLocks noGrp="1"/>
-          </p:cNvSpPr>
+          <p:cNvPicPr>
+            <a:picLocks noGrp="1" noChangeAspect="1"/>
+          </p:cNvPicPr>
           <p:nvPr>
             <p:ph idx="1"/>
           </p:nvPr>
-        </p:nvSpPr>
-        <p:spPr/>
-        <p:txBody>
-          <a:bodyPr/>
-          <a:lstStyle/>
-          <a:p>
-            <a:endParaRPr lang="en-NZ"/>
-          </a:p>
-        </p:txBody>
-      </p:sp>
+        </p:nvPicPr>
+        <p:blipFill rotWithShape="1">
+          <a:blip r:embed="rId2">
+            <a:extLst>
+              <a:ext uri="{28A0092B-C50C-407E-A947-70E740481C1C}">
+                <a14:useLocalDpi xmlns:a14="http://schemas.microsoft.com/office/drawing/2010/main" val="0"/>
+              </a:ext>
+            </a:extLst>
+          </a:blip>
+          <a:srcRect t="4090" b="7354"/>
+          <a:stretch/>
+        </p:blipFill>
+        <p:spPr>
+          <a:xfrm>
+            <a:off x="4670949" y="1926871"/>
+            <a:ext cx="2537938" cy="3995570"/>
+          </a:xfrm>
+        </p:spPr>
+      </p:pic>
+      <p:pic>
+        <p:nvPicPr>
+          <p:cNvPr id="7" name="Picture 6" descr="Text, table&#10;&#10;Description automatically generated with medium confidence">
+            <a:extLst>
+              <a:ext uri="{FF2B5EF4-FFF2-40B4-BE49-F238E27FC236}">
+                <a16:creationId xmlns:a16="http://schemas.microsoft.com/office/drawing/2014/main" id="{26C02FD6-BAB8-4601-8012-03F7F15852BC}"/>
+              </a:ext>
+            </a:extLst>
+          </p:cNvPr>
+          <p:cNvPicPr>
+            <a:picLocks noChangeAspect="1"/>
+          </p:cNvPicPr>
+          <p:nvPr/>
+        </p:nvPicPr>
+        <p:blipFill rotWithShape="1">
+          <a:blip r:embed="rId3">
+            <a:extLst>
+              <a:ext uri="{28A0092B-C50C-407E-A947-70E740481C1C}">
+                <a14:useLocalDpi xmlns:a14="http://schemas.microsoft.com/office/drawing/2010/main" val="0"/>
+              </a:ext>
+            </a:extLst>
+          </a:blip>
+          <a:srcRect t="3688" b="6891"/>
+          <a:stretch/>
+        </p:blipFill>
+        <p:spPr>
+          <a:xfrm>
+            <a:off x="1311343" y="1926871"/>
+            <a:ext cx="2513406" cy="3995570"/>
+          </a:xfrm>
+          <a:prstGeom prst="rect">
+            <a:avLst/>
+          </a:prstGeom>
+        </p:spPr>
+      </p:pic>
     </p:spTree>
     <p:extLst>
       <p:ext uri="{BB962C8B-B14F-4D97-AF65-F5344CB8AC3E}">

</xml_diff>

<commit_message>
Fixed the bug where invalid username briefly appeared before logging in with a valid user/pin. Registration sets the logged in user prefs. UAT Testing + Documentation updates.
</commit_message>
<xml_diff>
--- a/Documentation/Final Project Documentation/SD6501_FinalProject_Presentation_MDuToit.pptx
+++ b/Documentation/Final Project Documentation/SD6501_FinalProject_Presentation_MDuToit.pptx
@@ -170,7 +170,7 @@
           <a:noFill/>
           <a:extLst>
             <a:ext uri="{909E8E84-426E-40dd-AFC4-6F175D3DCCD1}">
-              <a14:hiddenFill xmlns:a14="http://schemas.microsoft.com/office/drawing/2010/main" xmlns="">
+              <a14:hiddenFill xmlns="" xmlns:a14="http://schemas.microsoft.com/office/drawing/2010/main">
                 <a:solidFill>
                   <a:srgbClr val="FFFFFF"/>
                 </a:solidFill>
@@ -230,7 +230,7 @@
             </a:ln>
             <a:extLst>
               <a:ext uri="{91240B29-F687-4f45-9708-019B960494DF}">
-                <a14:hiddenLine xmlns:a14="http://schemas.microsoft.com/office/drawing/2010/main" xmlns="" w="9525">
+                <a14:hiddenLine xmlns="" xmlns:a14="http://schemas.microsoft.com/office/drawing/2010/main" w="9525">
                   <a:solidFill>
                     <a:srgbClr val="000000"/>
                   </a:solidFill>
@@ -320,7 +320,7 @@
             </a:ln>
             <a:extLst>
               <a:ext uri="{91240B29-F687-4f45-9708-019B960494DF}">
-                <a14:hiddenLine xmlns:a14="http://schemas.microsoft.com/office/drawing/2010/main" xmlns="" w="9525">
+                <a14:hiddenLine xmlns="" xmlns:a14="http://schemas.microsoft.com/office/drawing/2010/main" w="9525">
                   <a:solidFill>
                     <a:srgbClr val="000000"/>
                   </a:solidFill>
@@ -410,7 +410,7 @@
             </a:ln>
             <a:extLst>
               <a:ext uri="{91240B29-F687-4f45-9708-019B960494DF}">
-                <a14:hiddenLine xmlns:a14="http://schemas.microsoft.com/office/drawing/2010/main" xmlns="" w="9525">
+                <a14:hiddenLine xmlns="" xmlns:a14="http://schemas.microsoft.com/office/drawing/2010/main" w="9525">
                   <a:solidFill>
                     <a:srgbClr val="000000"/>
                   </a:solidFill>
@@ -444,7 +444,7 @@
             </a:ln>
             <a:extLst>
               <a:ext uri="{91240B29-F687-4f45-9708-019B960494DF}">
-                <a14:hiddenLine xmlns:a14="http://schemas.microsoft.com/office/drawing/2010/main" xmlns="" w="9525">
+                <a14:hiddenLine xmlns="" xmlns:a14="http://schemas.microsoft.com/office/drawing/2010/main" w="9525">
                   <a:solidFill>
                     <a:srgbClr val="000000"/>
                   </a:solidFill>
@@ -534,7 +534,7 @@
             </a:ln>
             <a:extLst>
               <a:ext uri="{91240B29-F687-4f45-9708-019B960494DF}">
-                <a14:hiddenLine xmlns:a14="http://schemas.microsoft.com/office/drawing/2010/main" xmlns="" w="9525">
+                <a14:hiddenLine xmlns="" xmlns:a14="http://schemas.microsoft.com/office/drawing/2010/main" w="9525">
                   <a:solidFill>
                     <a:srgbClr val="000000"/>
                   </a:solidFill>
@@ -596,7 +596,7 @@
             </a:ln>
             <a:extLst>
               <a:ext uri="{91240B29-F687-4f45-9708-019B960494DF}">
-                <a14:hiddenLine xmlns:a14="http://schemas.microsoft.com/office/drawing/2010/main" xmlns="" w="9525">
+                <a14:hiddenLine xmlns="" xmlns:a14="http://schemas.microsoft.com/office/drawing/2010/main" w="9525">
                   <a:solidFill>
                     <a:srgbClr val="000000"/>
                   </a:solidFill>
@@ -658,7 +658,7 @@
             </a:ln>
             <a:extLst>
               <a:ext uri="{91240B29-F687-4f45-9708-019B960494DF}">
-                <a14:hiddenLine xmlns:a14="http://schemas.microsoft.com/office/drawing/2010/main" xmlns="" w="9525">
+                <a14:hiddenLine xmlns="" xmlns:a14="http://schemas.microsoft.com/office/drawing/2010/main" w="9525">
                   <a:solidFill>
                     <a:srgbClr val="000000"/>
                   </a:solidFill>
@@ -748,7 +748,7 @@
             </a:ln>
             <a:extLst>
               <a:ext uri="{91240B29-F687-4f45-9708-019B960494DF}">
-                <a14:hiddenLine xmlns:a14="http://schemas.microsoft.com/office/drawing/2010/main" xmlns="" w="9525">
+                <a14:hiddenLine xmlns="" xmlns:a14="http://schemas.microsoft.com/office/drawing/2010/main" w="9525">
                   <a:solidFill>
                     <a:srgbClr val="000000"/>
                   </a:solidFill>
@@ -810,7 +810,7 @@
             </a:ln>
             <a:extLst>
               <a:ext uri="{91240B29-F687-4f45-9708-019B960494DF}">
-                <a14:hiddenLine xmlns:a14="http://schemas.microsoft.com/office/drawing/2010/main" xmlns="" w="9525">
+                <a14:hiddenLine xmlns="" xmlns:a14="http://schemas.microsoft.com/office/drawing/2010/main" w="9525">
                   <a:solidFill>
                     <a:srgbClr val="000000"/>
                   </a:solidFill>
@@ -872,7 +872,7 @@
             </a:ln>
             <a:extLst>
               <a:ext uri="{91240B29-F687-4f45-9708-019B960494DF}">
-                <a14:hiddenLine xmlns:a14="http://schemas.microsoft.com/office/drawing/2010/main" xmlns="" w="9525">
+                <a14:hiddenLine xmlns="" xmlns:a14="http://schemas.microsoft.com/office/drawing/2010/main" w="9525">
                   <a:solidFill>
                     <a:srgbClr val="000000"/>
                   </a:solidFill>
@@ -962,7 +962,7 @@
             </a:ln>
             <a:extLst>
               <a:ext uri="{91240B29-F687-4f45-9708-019B960494DF}">
-                <a14:hiddenLine xmlns:a14="http://schemas.microsoft.com/office/drawing/2010/main" xmlns="" w="9525">
+                <a14:hiddenLine xmlns="" xmlns:a14="http://schemas.microsoft.com/office/drawing/2010/main" w="9525">
                   <a:solidFill>
                     <a:srgbClr val="000000"/>
                   </a:solidFill>
@@ -1052,7 +1052,7 @@
             </a:ln>
             <a:extLst>
               <a:ext uri="{91240B29-F687-4f45-9708-019B960494DF}">
-                <a14:hiddenLine xmlns:a14="http://schemas.microsoft.com/office/drawing/2010/main" xmlns="" w="9525">
+                <a14:hiddenLine xmlns="" xmlns:a14="http://schemas.microsoft.com/office/drawing/2010/main" w="9525">
                   <a:solidFill>
                     <a:srgbClr val="000000"/>
                   </a:solidFill>
@@ -1114,7 +1114,7 @@
             </a:ln>
             <a:extLst>
               <a:ext uri="{91240B29-F687-4f45-9708-019B960494DF}">
-                <a14:hiddenLine xmlns:a14="http://schemas.microsoft.com/office/drawing/2010/main" xmlns="" w="9525">
+                <a14:hiddenLine xmlns="" xmlns:a14="http://schemas.microsoft.com/office/drawing/2010/main" w="9525">
                   <a:solidFill>
                     <a:srgbClr val="000000"/>
                   </a:solidFill>
@@ -1224,7 +1224,7 @@
             </a:ln>
             <a:extLst>
               <a:ext uri="{91240B29-F687-4f45-9708-019B960494DF}">
-                <a14:hiddenLine xmlns:a14="http://schemas.microsoft.com/office/drawing/2010/main" xmlns="" w="9525">
+                <a14:hiddenLine xmlns="" xmlns:a14="http://schemas.microsoft.com/office/drawing/2010/main" w="9525">
                   <a:solidFill>
                     <a:srgbClr val="000000"/>
                   </a:solidFill>
@@ -1286,7 +1286,7 @@
             </a:ln>
             <a:extLst>
               <a:ext uri="{91240B29-F687-4f45-9708-019B960494DF}">
-                <a14:hiddenLine xmlns:a14="http://schemas.microsoft.com/office/drawing/2010/main" xmlns="" w="9525">
+                <a14:hiddenLine xmlns="" xmlns:a14="http://schemas.microsoft.com/office/drawing/2010/main" w="9525">
                   <a:solidFill>
                     <a:srgbClr val="000000"/>
                   </a:solidFill>
@@ -1376,7 +1376,7 @@
             </a:ln>
             <a:extLst>
               <a:ext uri="{91240B29-F687-4f45-9708-019B960494DF}">
-                <a14:hiddenLine xmlns:a14="http://schemas.microsoft.com/office/drawing/2010/main" xmlns="" w="9525">
+                <a14:hiddenLine xmlns="" xmlns:a14="http://schemas.microsoft.com/office/drawing/2010/main" w="9525">
                   <a:solidFill>
                     <a:srgbClr val="000000"/>
                   </a:solidFill>
@@ -1466,7 +1466,7 @@
             </a:ln>
             <a:extLst>
               <a:ext uri="{91240B29-F687-4f45-9708-019B960494DF}">
-                <a14:hiddenLine xmlns:a14="http://schemas.microsoft.com/office/drawing/2010/main" xmlns="" w="9525">
+                <a14:hiddenLine xmlns="" xmlns:a14="http://schemas.microsoft.com/office/drawing/2010/main" w="9525">
                   <a:solidFill>
                     <a:srgbClr val="000000"/>
                   </a:solidFill>
@@ -1528,7 +1528,7 @@
             </a:ln>
             <a:extLst>
               <a:ext uri="{91240B29-F687-4f45-9708-019B960494DF}">
-                <a14:hiddenLine xmlns:a14="http://schemas.microsoft.com/office/drawing/2010/main" xmlns="" w="9525">
+                <a14:hiddenLine xmlns="" xmlns:a14="http://schemas.microsoft.com/office/drawing/2010/main" w="9525">
                   <a:solidFill>
                     <a:srgbClr val="000000"/>
                   </a:solidFill>
@@ -1618,7 +1618,7 @@
             </a:ln>
             <a:extLst>
               <a:ext uri="{91240B29-F687-4f45-9708-019B960494DF}">
-                <a14:hiddenLine xmlns:a14="http://schemas.microsoft.com/office/drawing/2010/main" xmlns="" w="9525">
+                <a14:hiddenLine xmlns="" xmlns:a14="http://schemas.microsoft.com/office/drawing/2010/main" w="9525">
                   <a:solidFill>
                     <a:srgbClr val="000000"/>
                   </a:solidFill>
@@ -1708,7 +1708,7 @@
             </a:ln>
             <a:extLst>
               <a:ext uri="{91240B29-F687-4f45-9708-019B960494DF}">
-                <a14:hiddenLine xmlns:a14="http://schemas.microsoft.com/office/drawing/2010/main" xmlns="" w="9525">
+                <a14:hiddenLine xmlns="" xmlns:a14="http://schemas.microsoft.com/office/drawing/2010/main" w="9525">
                   <a:solidFill>
                     <a:srgbClr val="000000"/>
                   </a:solidFill>
@@ -1764,7 +1764,7 @@
             </a:ln>
             <a:extLst>
               <a:ext uri="{91240B29-F687-4f45-9708-019B960494DF}">
-                <a14:hiddenLine xmlns:a14="http://schemas.microsoft.com/office/drawing/2010/main" xmlns="" w="9525">
+                <a14:hiddenLine xmlns="" xmlns:a14="http://schemas.microsoft.com/office/drawing/2010/main" w="9525">
                   <a:solidFill>
                     <a:srgbClr val="000000"/>
                   </a:solidFill>
@@ -1854,7 +1854,7 @@
             </a:ln>
             <a:extLst>
               <a:ext uri="{91240B29-F687-4f45-9708-019B960494DF}">
-                <a14:hiddenLine xmlns:a14="http://schemas.microsoft.com/office/drawing/2010/main" xmlns="" w="9525">
+                <a14:hiddenLine xmlns="" xmlns:a14="http://schemas.microsoft.com/office/drawing/2010/main" w="9525">
                   <a:solidFill>
                     <a:srgbClr val="000000"/>
                   </a:solidFill>
@@ -1910,7 +1910,7 @@
             </a:ln>
             <a:extLst>
               <a:ext uri="{91240B29-F687-4f45-9708-019B960494DF}">
-                <a14:hiddenLine xmlns:a14="http://schemas.microsoft.com/office/drawing/2010/main" xmlns="" w="9525">
+                <a14:hiddenLine xmlns="" xmlns:a14="http://schemas.microsoft.com/office/drawing/2010/main" w="9525">
                   <a:solidFill>
                     <a:srgbClr val="000000"/>
                   </a:solidFill>
@@ -2000,7 +2000,7 @@
             </a:ln>
             <a:extLst>
               <a:ext uri="{91240B29-F687-4f45-9708-019B960494DF}">
-                <a14:hiddenLine xmlns:a14="http://schemas.microsoft.com/office/drawing/2010/main" xmlns="" w="9525">
+                <a14:hiddenLine xmlns="" xmlns:a14="http://schemas.microsoft.com/office/drawing/2010/main" w="9525">
                   <a:solidFill>
                     <a:srgbClr val="000000"/>
                   </a:solidFill>
@@ -2068,7 +2068,7 @@
             </a:ln>
             <a:extLst>
               <a:ext uri="{91240B29-F687-4f45-9708-019B960494DF}">
-                <a14:hiddenLine xmlns:a14="http://schemas.microsoft.com/office/drawing/2010/main" xmlns="" w="9525">
+                <a14:hiddenLine xmlns="" xmlns:a14="http://schemas.microsoft.com/office/drawing/2010/main" w="9525">
                   <a:solidFill>
                     <a:srgbClr val="000000"/>
                   </a:solidFill>
@@ -2158,7 +2158,7 @@
             </a:ln>
             <a:extLst>
               <a:ext uri="{91240B29-F687-4f45-9708-019B960494DF}">
-                <a14:hiddenLine xmlns:a14="http://schemas.microsoft.com/office/drawing/2010/main" xmlns="" w="9525">
+                <a14:hiddenLine xmlns="" xmlns:a14="http://schemas.microsoft.com/office/drawing/2010/main" w="9525">
                   <a:solidFill>
                     <a:srgbClr val="000000"/>
                   </a:solidFill>
@@ -2226,7 +2226,7 @@
             </a:ln>
             <a:extLst>
               <a:ext uri="{91240B29-F687-4f45-9708-019B960494DF}">
-                <a14:hiddenLine xmlns:a14="http://schemas.microsoft.com/office/drawing/2010/main" xmlns="" w="9525">
+                <a14:hiddenLine xmlns="" xmlns:a14="http://schemas.microsoft.com/office/drawing/2010/main" w="9525">
                   <a:solidFill>
                     <a:srgbClr val="000000"/>
                   </a:solidFill>
@@ -2316,7 +2316,7 @@
             </a:ln>
             <a:extLst>
               <a:ext uri="{91240B29-F687-4f45-9708-019B960494DF}">
-                <a14:hiddenLine xmlns:a14="http://schemas.microsoft.com/office/drawing/2010/main" xmlns="" w="9525">
+                <a14:hiddenLine xmlns="" xmlns:a14="http://schemas.microsoft.com/office/drawing/2010/main" w="9525">
                   <a:solidFill>
                     <a:srgbClr val="000000"/>
                   </a:solidFill>
@@ -2350,7 +2350,7 @@
             </a:ln>
             <a:extLst>
               <a:ext uri="{91240B29-F687-4f45-9708-019B960494DF}">
-                <a14:hiddenLine xmlns:a14="http://schemas.microsoft.com/office/drawing/2010/main" xmlns="" w="9525">
+                <a14:hiddenLine xmlns="" xmlns:a14="http://schemas.microsoft.com/office/drawing/2010/main" w="9525">
                   <a:solidFill>
                     <a:srgbClr val="000000"/>
                   </a:solidFill>
@@ -2440,7 +2440,7 @@
             </a:ln>
             <a:extLst>
               <a:ext uri="{91240B29-F687-4f45-9708-019B960494DF}">
-                <a14:hiddenLine xmlns:a14="http://schemas.microsoft.com/office/drawing/2010/main" xmlns="" w="9525">
+                <a14:hiddenLine xmlns="" xmlns:a14="http://schemas.microsoft.com/office/drawing/2010/main" w="9525">
                   <a:solidFill>
                     <a:srgbClr val="000000"/>
                   </a:solidFill>
@@ -2502,7 +2502,7 @@
             </a:ln>
             <a:extLst>
               <a:ext uri="{91240B29-F687-4f45-9708-019B960494DF}">
-                <a14:hiddenLine xmlns:a14="http://schemas.microsoft.com/office/drawing/2010/main" xmlns="" w="9525">
+                <a14:hiddenLine xmlns="" xmlns:a14="http://schemas.microsoft.com/office/drawing/2010/main" w="9525">
                   <a:solidFill>
                     <a:srgbClr val="000000"/>
                   </a:solidFill>
@@ -2564,7 +2564,7 @@
             </a:ln>
             <a:extLst>
               <a:ext uri="{91240B29-F687-4f45-9708-019B960494DF}">
-                <a14:hiddenLine xmlns:a14="http://schemas.microsoft.com/office/drawing/2010/main" xmlns="" w="9525">
+                <a14:hiddenLine xmlns="" xmlns:a14="http://schemas.microsoft.com/office/drawing/2010/main" w="9525">
                   <a:solidFill>
                     <a:srgbClr val="000000"/>
                   </a:solidFill>
@@ -2654,7 +2654,7 @@
             </a:ln>
             <a:extLst>
               <a:ext uri="{91240B29-F687-4f45-9708-019B960494DF}">
-                <a14:hiddenLine xmlns:a14="http://schemas.microsoft.com/office/drawing/2010/main" xmlns="" w="9525">
+                <a14:hiddenLine xmlns="" xmlns:a14="http://schemas.microsoft.com/office/drawing/2010/main" w="9525">
                   <a:solidFill>
                     <a:srgbClr val="000000"/>
                   </a:solidFill>
@@ -2722,7 +2722,7 @@
             </a:ln>
             <a:extLst>
               <a:ext uri="{91240B29-F687-4f45-9708-019B960494DF}">
-                <a14:hiddenLine xmlns:a14="http://schemas.microsoft.com/office/drawing/2010/main" xmlns="" w="9525">
+                <a14:hiddenLine xmlns="" xmlns:a14="http://schemas.microsoft.com/office/drawing/2010/main" w="9525">
                   <a:solidFill>
                     <a:srgbClr val="000000"/>
                   </a:solidFill>
@@ -2784,7 +2784,7 @@
             </a:ln>
             <a:extLst>
               <a:ext uri="{91240B29-F687-4f45-9708-019B960494DF}">
-                <a14:hiddenLine xmlns:a14="http://schemas.microsoft.com/office/drawing/2010/main" xmlns="" w="9525">
+                <a14:hiddenLine xmlns="" xmlns:a14="http://schemas.microsoft.com/office/drawing/2010/main" w="9525">
                   <a:solidFill>
                     <a:srgbClr val="000000"/>
                   </a:solidFill>
@@ -2874,7 +2874,7 @@
             </a:ln>
             <a:extLst>
               <a:ext uri="{91240B29-F687-4f45-9708-019B960494DF}">
-                <a14:hiddenLine xmlns:a14="http://schemas.microsoft.com/office/drawing/2010/main" xmlns="" w="9525">
+                <a14:hiddenLine xmlns="" xmlns:a14="http://schemas.microsoft.com/office/drawing/2010/main" w="9525">
                   <a:solidFill>
                     <a:srgbClr val="000000"/>
                   </a:solidFill>
@@ -2936,7 +2936,7 @@
             </a:ln>
             <a:extLst>
               <a:ext uri="{91240B29-F687-4f45-9708-019B960494DF}">
-                <a14:hiddenLine xmlns:a14="http://schemas.microsoft.com/office/drawing/2010/main" xmlns="" w="9525">
+                <a14:hiddenLine xmlns="" xmlns:a14="http://schemas.microsoft.com/office/drawing/2010/main" w="9525">
                   <a:solidFill>
                     <a:srgbClr val="000000"/>
                   </a:solidFill>
@@ -3026,7 +3026,7 @@
             </a:ln>
             <a:extLst>
               <a:ext uri="{91240B29-F687-4f45-9708-019B960494DF}">
-                <a14:hiddenLine xmlns:a14="http://schemas.microsoft.com/office/drawing/2010/main" xmlns="" w="9525">
+                <a14:hiddenLine xmlns="" xmlns:a14="http://schemas.microsoft.com/office/drawing/2010/main" w="9525">
                   <a:solidFill>
                     <a:srgbClr val="000000"/>
                   </a:solidFill>
@@ -3088,7 +3088,7 @@
             </a:ln>
             <a:extLst>
               <a:ext uri="{91240B29-F687-4f45-9708-019B960494DF}">
-                <a14:hiddenLine xmlns:a14="http://schemas.microsoft.com/office/drawing/2010/main" xmlns="" w="9525">
+                <a14:hiddenLine xmlns="" xmlns:a14="http://schemas.microsoft.com/office/drawing/2010/main" w="9525">
                   <a:solidFill>
                     <a:srgbClr val="000000"/>
                   </a:solidFill>
@@ -3178,7 +3178,7 @@
             </a:ln>
             <a:extLst>
               <a:ext uri="{91240B29-F687-4f45-9708-019B960494DF}">
-                <a14:hiddenLine xmlns:a14="http://schemas.microsoft.com/office/drawing/2010/main" xmlns="" w="9525">
+                <a14:hiddenLine xmlns="" xmlns:a14="http://schemas.microsoft.com/office/drawing/2010/main" w="9525">
                   <a:solidFill>
                     <a:srgbClr val="000000"/>
                   </a:solidFill>
@@ -3212,7 +3212,7 @@
             </a:ln>
             <a:extLst>
               <a:ext uri="{91240B29-F687-4f45-9708-019B960494DF}">
-                <a14:hiddenLine xmlns:a14="http://schemas.microsoft.com/office/drawing/2010/main" xmlns="" w="9525">
+                <a14:hiddenLine xmlns="" xmlns:a14="http://schemas.microsoft.com/office/drawing/2010/main" w="9525">
                   <a:solidFill>
                     <a:srgbClr val="000000"/>
                   </a:solidFill>
@@ -3277,7 +3277,7 @@
             </a:ln>
             <a:extLst>
               <a:ext uri="{91240B29-F687-4f45-9708-019B960494DF}">
-                <a14:hiddenLine xmlns:a14="http://schemas.microsoft.com/office/drawing/2010/main" xmlns="" w="9525">
+                <a14:hiddenLine xmlns="" xmlns:a14="http://schemas.microsoft.com/office/drawing/2010/main" w="9525">
                   <a:solidFill>
                     <a:srgbClr val="000000"/>
                   </a:solidFill>
@@ -3367,7 +3367,7 @@
             </a:ln>
             <a:extLst>
               <a:ext uri="{91240B29-F687-4f45-9708-019B960494DF}">
-                <a14:hiddenLine xmlns:a14="http://schemas.microsoft.com/office/drawing/2010/main" xmlns="" w="9525">
+                <a14:hiddenLine xmlns="" xmlns:a14="http://schemas.microsoft.com/office/drawing/2010/main" w="9525">
                   <a:solidFill>
                     <a:srgbClr val="000000"/>
                   </a:solidFill>
@@ -3429,7 +3429,7 @@
             </a:ln>
             <a:extLst>
               <a:ext uri="{91240B29-F687-4f45-9708-019B960494DF}">
-                <a14:hiddenLine xmlns:a14="http://schemas.microsoft.com/office/drawing/2010/main" xmlns="" w="9525">
+                <a14:hiddenLine xmlns="" xmlns:a14="http://schemas.microsoft.com/office/drawing/2010/main" w="9525">
                   <a:solidFill>
                     <a:srgbClr val="000000"/>
                   </a:solidFill>
@@ -3519,7 +3519,7 @@
             </a:ln>
             <a:extLst>
               <a:ext uri="{91240B29-F687-4f45-9708-019B960494DF}">
-                <a14:hiddenLine xmlns:a14="http://schemas.microsoft.com/office/drawing/2010/main" xmlns="" w="9525">
+                <a14:hiddenLine xmlns="" xmlns:a14="http://schemas.microsoft.com/office/drawing/2010/main" w="9525">
                   <a:solidFill>
                     <a:srgbClr val="000000"/>
                   </a:solidFill>
@@ -3609,7 +3609,7 @@
             </a:ln>
             <a:extLst>
               <a:ext uri="{91240B29-F687-4f45-9708-019B960494DF}">
-                <a14:hiddenLine xmlns:a14="http://schemas.microsoft.com/office/drawing/2010/main" xmlns="" w="9525">
+                <a14:hiddenLine xmlns="" xmlns:a14="http://schemas.microsoft.com/office/drawing/2010/main" w="9525">
                   <a:solidFill>
                     <a:srgbClr val="000000"/>
                   </a:solidFill>
@@ -3674,7 +3674,7 @@
             </a:ln>
             <a:extLst>
               <a:ext uri="{91240B29-F687-4f45-9708-019B960494DF}">
-                <a14:hiddenLine xmlns:a14="http://schemas.microsoft.com/office/drawing/2010/main" xmlns="" w="9525">
+                <a14:hiddenLine xmlns="" xmlns:a14="http://schemas.microsoft.com/office/drawing/2010/main" w="9525">
                   <a:solidFill>
                     <a:srgbClr val="000000"/>
                   </a:solidFill>
@@ -3736,7 +3736,7 @@
             </a:ln>
             <a:extLst>
               <a:ext uri="{91240B29-F687-4f45-9708-019B960494DF}">
-                <a14:hiddenLine xmlns:a14="http://schemas.microsoft.com/office/drawing/2010/main" xmlns="" w="9525">
+                <a14:hiddenLine xmlns="" xmlns:a14="http://schemas.microsoft.com/office/drawing/2010/main" w="9525">
                   <a:solidFill>
                     <a:srgbClr val="000000"/>
                   </a:solidFill>
@@ -3826,7 +3826,7 @@
             </a:ln>
             <a:extLst>
               <a:ext uri="{91240B29-F687-4f45-9708-019B960494DF}">
-                <a14:hiddenLine xmlns:a14="http://schemas.microsoft.com/office/drawing/2010/main" xmlns="" w="9525">
+                <a14:hiddenLine xmlns="" xmlns:a14="http://schemas.microsoft.com/office/drawing/2010/main" w="9525">
                   <a:solidFill>
                     <a:srgbClr val="000000"/>
                   </a:solidFill>
@@ -3916,7 +3916,7 @@
             </a:ln>
             <a:extLst>
               <a:ext uri="{91240B29-F687-4f45-9708-019B960494DF}">
-                <a14:hiddenLine xmlns:a14="http://schemas.microsoft.com/office/drawing/2010/main" xmlns="" w="9525">
+                <a14:hiddenLine xmlns="" xmlns:a14="http://schemas.microsoft.com/office/drawing/2010/main" w="9525">
                   <a:solidFill>
                     <a:srgbClr val="000000"/>
                   </a:solidFill>
@@ -3978,7 +3978,7 @@
             </a:ln>
             <a:extLst>
               <a:ext uri="{91240B29-F687-4f45-9708-019B960494DF}">
-                <a14:hiddenLine xmlns:a14="http://schemas.microsoft.com/office/drawing/2010/main" xmlns="" w="9525">
+                <a14:hiddenLine xmlns="" xmlns:a14="http://schemas.microsoft.com/office/drawing/2010/main" w="9525">
                   <a:solidFill>
                     <a:srgbClr val="000000"/>
                   </a:solidFill>
@@ -4098,7 +4098,7 @@
             </a:ln>
             <a:extLst>
               <a:ext uri="{91240B29-F687-4f45-9708-019B960494DF}">
-                <a14:hiddenLine xmlns:a14="http://schemas.microsoft.com/office/drawing/2010/main" xmlns="" w="9525">
+                <a14:hiddenLine xmlns="" xmlns:a14="http://schemas.microsoft.com/office/drawing/2010/main" w="9525">
                   <a:solidFill>
                     <a:srgbClr val="000000"/>
                   </a:solidFill>
@@ -4166,7 +4166,7 @@
             </a:ln>
             <a:extLst>
               <a:ext uri="{91240B29-F687-4f45-9708-019B960494DF}">
-                <a14:hiddenLine xmlns:a14="http://schemas.microsoft.com/office/drawing/2010/main" xmlns="" w="9525">
+                <a14:hiddenLine xmlns="" xmlns:a14="http://schemas.microsoft.com/office/drawing/2010/main" w="9525">
                   <a:solidFill>
                     <a:srgbClr val="000000"/>
                   </a:solidFill>
@@ -4256,7 +4256,7 @@
             </a:ln>
             <a:extLst>
               <a:ext uri="{91240B29-F687-4f45-9708-019B960494DF}">
-                <a14:hiddenLine xmlns:a14="http://schemas.microsoft.com/office/drawing/2010/main" xmlns="" w="9525">
+                <a14:hiddenLine xmlns="" xmlns:a14="http://schemas.microsoft.com/office/drawing/2010/main" w="9525">
                   <a:solidFill>
                     <a:srgbClr val="000000"/>
                   </a:solidFill>
@@ -9063,7 +9063,7 @@
           <a:noFill/>
           <a:extLst>
             <a:ext uri="{909E8E84-426E-40dd-AFC4-6F175D3DCCD1}">
-              <a14:hiddenFill xmlns:a14="http://schemas.microsoft.com/office/drawing/2010/main" xmlns="">
+              <a14:hiddenFill xmlns="" xmlns:a14="http://schemas.microsoft.com/office/drawing/2010/main">
                 <a:solidFill>
                   <a:srgbClr val="FFFFFF"/>
                 </a:solidFill>
@@ -9137,7 +9137,7 @@
               </a:ln>
               <a:extLst>
                 <a:ext uri="{91240B29-F687-4f45-9708-019B960494DF}">
-                  <a14:hiddenLine xmlns:a14="http://schemas.microsoft.com/office/drawing/2010/main" xmlns="" w="9525">
+                  <a14:hiddenLine xmlns="" xmlns:a14="http://schemas.microsoft.com/office/drawing/2010/main" w="9525">
                     <a:solidFill>
                       <a:srgbClr val="000000"/>
                     </a:solidFill>
@@ -9227,7 +9227,7 @@
               </a:ln>
               <a:extLst>
                 <a:ext uri="{91240B29-F687-4f45-9708-019B960494DF}">
-                  <a14:hiddenLine xmlns:a14="http://schemas.microsoft.com/office/drawing/2010/main" xmlns="" w="9525">
+                  <a14:hiddenLine xmlns="" xmlns:a14="http://schemas.microsoft.com/office/drawing/2010/main" w="9525">
                     <a:solidFill>
                       <a:srgbClr val="000000"/>
                     </a:solidFill>
@@ -9317,7 +9317,7 @@
               </a:ln>
               <a:extLst>
                 <a:ext uri="{91240B29-F687-4f45-9708-019B960494DF}">
-                  <a14:hiddenLine xmlns:a14="http://schemas.microsoft.com/office/drawing/2010/main" xmlns="" w="9525">
+                  <a14:hiddenLine xmlns="" xmlns:a14="http://schemas.microsoft.com/office/drawing/2010/main" w="9525">
                     <a:solidFill>
                       <a:srgbClr val="000000"/>
                     </a:solidFill>
@@ -9379,7 +9379,7 @@
               </a:ln>
               <a:extLst>
                 <a:ext uri="{91240B29-F687-4f45-9708-019B960494DF}">
-                  <a14:hiddenLine xmlns:a14="http://schemas.microsoft.com/office/drawing/2010/main" xmlns="" w="9525">
+                  <a14:hiddenLine xmlns="" xmlns:a14="http://schemas.microsoft.com/office/drawing/2010/main" w="9525">
                     <a:solidFill>
                       <a:srgbClr val="000000"/>
                     </a:solidFill>
@@ -9469,7 +9469,7 @@
               </a:ln>
               <a:extLst>
                 <a:ext uri="{91240B29-F687-4f45-9708-019B960494DF}">
-                  <a14:hiddenLine xmlns:a14="http://schemas.microsoft.com/office/drawing/2010/main" xmlns="" w="9525">
+                  <a14:hiddenLine xmlns="" xmlns:a14="http://schemas.microsoft.com/office/drawing/2010/main" w="9525">
                     <a:solidFill>
                       <a:srgbClr val="000000"/>
                     </a:solidFill>
@@ -9531,7 +9531,7 @@
               </a:ln>
               <a:extLst>
                 <a:ext uri="{91240B29-F687-4f45-9708-019B960494DF}">
-                  <a14:hiddenLine xmlns:a14="http://schemas.microsoft.com/office/drawing/2010/main" xmlns="" w="9525">
+                  <a14:hiddenLine xmlns="" xmlns:a14="http://schemas.microsoft.com/office/drawing/2010/main" w="9525">
                     <a:solidFill>
                       <a:srgbClr val="000000"/>
                     </a:solidFill>
@@ -9593,7 +9593,7 @@
               </a:ln>
               <a:extLst>
                 <a:ext uri="{91240B29-F687-4f45-9708-019B960494DF}">
-                  <a14:hiddenLine xmlns:a14="http://schemas.microsoft.com/office/drawing/2010/main" xmlns="" w="9525">
+                  <a14:hiddenLine xmlns="" xmlns:a14="http://schemas.microsoft.com/office/drawing/2010/main" w="9525">
                     <a:solidFill>
                       <a:srgbClr val="000000"/>
                     </a:solidFill>
@@ -9683,7 +9683,7 @@
               </a:ln>
               <a:extLst>
                 <a:ext uri="{91240B29-F687-4f45-9708-019B960494DF}">
-                  <a14:hiddenLine xmlns:a14="http://schemas.microsoft.com/office/drawing/2010/main" xmlns="" w="9525">
+                  <a14:hiddenLine xmlns="" xmlns:a14="http://schemas.microsoft.com/office/drawing/2010/main" w="9525">
                     <a:solidFill>
                       <a:srgbClr val="000000"/>
                     </a:solidFill>
@@ -9773,7 +9773,7 @@
               </a:ln>
               <a:extLst>
                 <a:ext uri="{91240B29-F687-4f45-9708-019B960494DF}">
-                  <a14:hiddenLine xmlns:a14="http://schemas.microsoft.com/office/drawing/2010/main" xmlns="" w="9525">
+                  <a14:hiddenLine xmlns="" xmlns:a14="http://schemas.microsoft.com/office/drawing/2010/main" w="9525">
                     <a:solidFill>
                       <a:srgbClr val="000000"/>
                     </a:solidFill>
@@ -9835,7 +9835,7 @@
               </a:ln>
               <a:extLst>
                 <a:ext uri="{91240B29-F687-4f45-9708-019B960494DF}">
-                  <a14:hiddenLine xmlns:a14="http://schemas.microsoft.com/office/drawing/2010/main" xmlns="" w="9525">
+                  <a14:hiddenLine xmlns="" xmlns:a14="http://schemas.microsoft.com/office/drawing/2010/main" w="9525">
                     <a:solidFill>
                       <a:srgbClr val="000000"/>
                     </a:solidFill>
@@ -9945,7 +9945,7 @@
               </a:ln>
               <a:extLst>
                 <a:ext uri="{91240B29-F687-4f45-9708-019B960494DF}">
-                  <a14:hiddenLine xmlns:a14="http://schemas.microsoft.com/office/drawing/2010/main" xmlns="" w="9525">
+                  <a14:hiddenLine xmlns="" xmlns:a14="http://schemas.microsoft.com/office/drawing/2010/main" w="9525">
                     <a:solidFill>
                       <a:srgbClr val="000000"/>
                     </a:solidFill>
@@ -10029,7 +10029,7 @@
               </a:ln>
               <a:extLst>
                 <a:ext uri="{91240B29-F687-4f45-9708-019B960494DF}">
-                  <a14:hiddenLine xmlns:a14="http://schemas.microsoft.com/office/drawing/2010/main" xmlns="" w="9525">
+                  <a14:hiddenLine xmlns="" xmlns:a14="http://schemas.microsoft.com/office/drawing/2010/main" w="9525">
                     <a:solidFill>
                       <a:srgbClr val="000000"/>
                     </a:solidFill>
@@ -10091,7 +10091,7 @@
               </a:ln>
               <a:extLst>
                 <a:ext uri="{91240B29-F687-4f45-9708-019B960494DF}">
-                  <a14:hiddenLine xmlns:a14="http://schemas.microsoft.com/office/drawing/2010/main" xmlns="" w="9525">
+                  <a14:hiddenLine xmlns="" xmlns:a14="http://schemas.microsoft.com/office/drawing/2010/main" w="9525">
                     <a:solidFill>
                       <a:srgbClr val="000000"/>
                     </a:solidFill>
@@ -10153,7 +10153,7 @@
               </a:ln>
               <a:extLst>
                 <a:ext uri="{91240B29-F687-4f45-9708-019B960494DF}">
-                  <a14:hiddenLine xmlns:a14="http://schemas.microsoft.com/office/drawing/2010/main" xmlns="" w="9525">
+                  <a14:hiddenLine xmlns="" xmlns:a14="http://schemas.microsoft.com/office/drawing/2010/main" w="9525">
                     <a:solidFill>
                       <a:srgbClr val="000000"/>
                     </a:solidFill>
@@ -10243,7 +10243,7 @@
               </a:ln>
               <a:extLst>
                 <a:ext uri="{91240B29-F687-4f45-9708-019B960494DF}">
-                  <a14:hiddenLine xmlns:a14="http://schemas.microsoft.com/office/drawing/2010/main" xmlns="" w="9525">
+                  <a14:hiddenLine xmlns="" xmlns:a14="http://schemas.microsoft.com/office/drawing/2010/main" w="9525">
                     <a:solidFill>
                       <a:srgbClr val="000000"/>
                     </a:solidFill>
@@ -10277,7 +10277,7 @@
               </a:ln>
               <a:extLst>
                 <a:ext uri="{91240B29-F687-4f45-9708-019B960494DF}">
-                  <a14:hiddenLine xmlns:a14="http://schemas.microsoft.com/office/drawing/2010/main" xmlns="" w="9525">
+                  <a14:hiddenLine xmlns="" xmlns:a14="http://schemas.microsoft.com/office/drawing/2010/main" w="9525">
                     <a:solidFill>
                       <a:srgbClr val="000000"/>
                     </a:solidFill>
@@ -10342,7 +10342,7 @@
               </a:ln>
               <a:extLst>
                 <a:ext uri="{91240B29-F687-4f45-9708-019B960494DF}">
-                  <a14:hiddenLine xmlns:a14="http://schemas.microsoft.com/office/drawing/2010/main" xmlns="" w="9525">
+                  <a14:hiddenLine xmlns="" xmlns:a14="http://schemas.microsoft.com/office/drawing/2010/main" w="9525">
                     <a:solidFill>
                       <a:srgbClr val="000000"/>
                     </a:solidFill>
@@ -10432,7 +10432,7 @@
               </a:ln>
               <a:extLst>
                 <a:ext uri="{91240B29-F687-4f45-9708-019B960494DF}">
-                  <a14:hiddenLine xmlns:a14="http://schemas.microsoft.com/office/drawing/2010/main" xmlns="" w="9525">
+                  <a14:hiddenLine xmlns="" xmlns:a14="http://schemas.microsoft.com/office/drawing/2010/main" w="9525">
                     <a:solidFill>
                       <a:srgbClr val="000000"/>
                     </a:solidFill>
@@ -10494,7 +10494,7 @@
               </a:ln>
               <a:extLst>
                 <a:ext uri="{91240B29-F687-4f45-9708-019B960494DF}">
-                  <a14:hiddenLine xmlns:a14="http://schemas.microsoft.com/office/drawing/2010/main" xmlns="" w="9525">
+                  <a14:hiddenLine xmlns="" xmlns:a14="http://schemas.microsoft.com/office/drawing/2010/main" w="9525">
                     <a:solidFill>
                       <a:srgbClr val="000000"/>
                     </a:solidFill>
@@ -10584,7 +10584,7 @@
               </a:ln>
               <a:extLst>
                 <a:ext uri="{91240B29-F687-4f45-9708-019B960494DF}">
-                  <a14:hiddenLine xmlns:a14="http://schemas.microsoft.com/office/drawing/2010/main" xmlns="" w="9525">
+                  <a14:hiddenLine xmlns="" xmlns:a14="http://schemas.microsoft.com/office/drawing/2010/main" w="9525">
                     <a:solidFill>
                       <a:srgbClr val="000000"/>
                     </a:solidFill>
@@ -10649,7 +10649,7 @@
               </a:ln>
               <a:extLst>
                 <a:ext uri="{91240B29-F687-4f45-9708-019B960494DF}">
-                  <a14:hiddenLine xmlns:a14="http://schemas.microsoft.com/office/drawing/2010/main" xmlns="" w="9525">
+                  <a14:hiddenLine xmlns="" xmlns:a14="http://schemas.microsoft.com/office/drawing/2010/main" w="9525">
                     <a:solidFill>
                       <a:srgbClr val="000000"/>
                     </a:solidFill>
@@ -10711,7 +10711,7 @@
               </a:ln>
               <a:extLst>
                 <a:ext uri="{91240B29-F687-4f45-9708-019B960494DF}">
-                  <a14:hiddenLine xmlns:a14="http://schemas.microsoft.com/office/drawing/2010/main" xmlns="" w="9525">
+                  <a14:hiddenLine xmlns="" xmlns:a14="http://schemas.microsoft.com/office/drawing/2010/main" w="9525">
                     <a:solidFill>
                       <a:srgbClr val="000000"/>
                     </a:solidFill>
@@ -10801,7 +10801,7 @@
               </a:ln>
               <a:extLst>
                 <a:ext uri="{91240B29-F687-4f45-9708-019B960494DF}">
-                  <a14:hiddenLine xmlns:a14="http://schemas.microsoft.com/office/drawing/2010/main" xmlns="" w="9525">
+                  <a14:hiddenLine xmlns="" xmlns:a14="http://schemas.microsoft.com/office/drawing/2010/main" w="9525">
                     <a:solidFill>
                       <a:srgbClr val="000000"/>
                     </a:solidFill>
@@ -10891,7 +10891,7 @@
               </a:ln>
               <a:extLst>
                 <a:ext uri="{91240B29-F687-4f45-9708-019B960494DF}">
-                  <a14:hiddenLine xmlns:a14="http://schemas.microsoft.com/office/drawing/2010/main" xmlns="" w="9525">
+                  <a14:hiddenLine xmlns="" xmlns:a14="http://schemas.microsoft.com/office/drawing/2010/main" w="9525">
                     <a:solidFill>
                       <a:srgbClr val="000000"/>
                     </a:solidFill>
@@ -10956,7 +10956,7 @@
               </a:ln>
               <a:extLst>
                 <a:ext uri="{91240B29-F687-4f45-9708-019B960494DF}">
-                  <a14:hiddenLine xmlns:a14="http://schemas.microsoft.com/office/drawing/2010/main" xmlns="" w="9525">
+                  <a14:hiddenLine xmlns="" xmlns:a14="http://schemas.microsoft.com/office/drawing/2010/main" w="9525">
                     <a:solidFill>
                       <a:srgbClr val="000000"/>
                     </a:solidFill>
@@ -11076,7 +11076,7 @@
               </a:ln>
               <a:extLst>
                 <a:ext uri="{91240B29-F687-4f45-9708-019B960494DF}">
-                  <a14:hiddenLine xmlns:a14="http://schemas.microsoft.com/office/drawing/2010/main" xmlns="" w="9525">
+                  <a14:hiddenLine xmlns="" xmlns:a14="http://schemas.microsoft.com/office/drawing/2010/main" w="9525">
                     <a:solidFill>
                       <a:srgbClr val="000000"/>
                     </a:solidFill>
@@ -11174,7 +11174,7 @@
               </a:ln>
               <a:extLst>
                 <a:ext uri="{91240B29-F687-4f45-9708-019B960494DF}">
-                  <a14:hiddenLine xmlns:a14="http://schemas.microsoft.com/office/drawing/2010/main" xmlns="" w="9525">
+                  <a14:hiddenLine xmlns="" xmlns:a14="http://schemas.microsoft.com/office/drawing/2010/main" w="9525">
                     <a:solidFill>
                       <a:srgbClr val="000000"/>
                     </a:solidFill>
@@ -11289,7 +11289,7 @@
               </a:ln>
               <a:extLst>
                 <a:ext uri="{91240B29-F687-4f45-9708-019B960494DF}">
-                  <a14:hiddenLine xmlns:a14="http://schemas.microsoft.com/office/drawing/2010/main" xmlns="" w="9525">
+                  <a14:hiddenLine xmlns="" xmlns:a14="http://schemas.microsoft.com/office/drawing/2010/main" w="9525">
                     <a:solidFill>
                       <a:srgbClr val="000000"/>
                     </a:solidFill>
@@ -11379,7 +11379,7 @@
               </a:ln>
               <a:extLst>
                 <a:ext uri="{91240B29-F687-4f45-9708-019B960494DF}">
-                  <a14:hiddenLine xmlns:a14="http://schemas.microsoft.com/office/drawing/2010/main" xmlns="" w="9525">
+                  <a14:hiddenLine xmlns="" xmlns:a14="http://schemas.microsoft.com/office/drawing/2010/main" w="9525">
                     <a:solidFill>
                       <a:srgbClr val="000000"/>
                     </a:solidFill>
@@ -11444,7 +11444,7 @@
               </a:ln>
               <a:extLst>
                 <a:ext uri="{91240B29-F687-4f45-9708-019B960494DF}">
-                  <a14:hiddenLine xmlns:a14="http://schemas.microsoft.com/office/drawing/2010/main" xmlns="" w="9525">
+                  <a14:hiddenLine xmlns="" xmlns:a14="http://schemas.microsoft.com/office/drawing/2010/main" w="9525">
                     <a:solidFill>
                       <a:srgbClr val="000000"/>
                     </a:solidFill>
@@ -11534,7 +11534,7 @@
               </a:ln>
               <a:extLst>
                 <a:ext uri="{91240B29-F687-4f45-9708-019B960494DF}">
-                  <a14:hiddenLine xmlns:a14="http://schemas.microsoft.com/office/drawing/2010/main" xmlns="" w="9525">
+                  <a14:hiddenLine xmlns="" xmlns:a14="http://schemas.microsoft.com/office/drawing/2010/main" w="9525">
                     <a:solidFill>
                       <a:srgbClr val="000000"/>
                     </a:solidFill>
@@ -11602,7 +11602,7 @@
               </a:ln>
               <a:extLst>
                 <a:ext uri="{91240B29-F687-4f45-9708-019B960494DF}">
-                  <a14:hiddenLine xmlns:a14="http://schemas.microsoft.com/office/drawing/2010/main" xmlns="" w="9525">
+                  <a14:hiddenLine xmlns="" xmlns:a14="http://schemas.microsoft.com/office/drawing/2010/main" w="9525">
                     <a:solidFill>
                       <a:srgbClr val="000000"/>
                     </a:solidFill>
@@ -11692,7 +11692,7 @@
               </a:ln>
               <a:extLst>
                 <a:ext uri="{91240B29-F687-4f45-9708-019B960494DF}">
-                  <a14:hiddenLine xmlns:a14="http://schemas.microsoft.com/office/drawing/2010/main" xmlns="" w="9525">
+                  <a14:hiddenLine xmlns="" xmlns:a14="http://schemas.microsoft.com/office/drawing/2010/main" w="9525">
                     <a:solidFill>
                       <a:srgbClr val="000000"/>
                     </a:solidFill>
@@ -11760,7 +11760,7 @@
               </a:ln>
               <a:extLst>
                 <a:ext uri="{91240B29-F687-4f45-9708-019B960494DF}">
-                  <a14:hiddenLine xmlns:a14="http://schemas.microsoft.com/office/drawing/2010/main" xmlns="" w="9525">
+                  <a14:hiddenLine xmlns="" xmlns:a14="http://schemas.microsoft.com/office/drawing/2010/main" w="9525">
                     <a:solidFill>
                       <a:srgbClr val="000000"/>
                     </a:solidFill>
@@ -11850,7 +11850,7 @@
               </a:ln>
               <a:extLst>
                 <a:ext uri="{91240B29-F687-4f45-9708-019B960494DF}">
-                  <a14:hiddenLine xmlns:a14="http://schemas.microsoft.com/office/drawing/2010/main" xmlns="" w="9525">
+                  <a14:hiddenLine xmlns="" xmlns:a14="http://schemas.microsoft.com/office/drawing/2010/main" w="9525">
                     <a:solidFill>
                       <a:srgbClr val="000000"/>
                     </a:solidFill>
@@ -11884,7 +11884,7 @@
               </a:ln>
               <a:extLst>
                 <a:ext uri="{91240B29-F687-4f45-9708-019B960494DF}">
-                  <a14:hiddenLine xmlns:a14="http://schemas.microsoft.com/office/drawing/2010/main" xmlns="" w="9525">
+                  <a14:hiddenLine xmlns="" xmlns:a14="http://schemas.microsoft.com/office/drawing/2010/main" w="9525">
                     <a:solidFill>
                       <a:srgbClr val="000000"/>
                     </a:solidFill>
@@ -13799,6 +13799,16 @@
               <a:rPr lang="en-US" dirty="0"/>
               <a:t>Sometimes you just need to make a decision.</a:t>
             </a:r>
+          </a:p>
+          <a:p>
+            <a:r>
+              <a:rPr lang="en-US" dirty="0"/>
+              <a:t>Refining existing features vs. </a:t>
+            </a:r>
+            <a:r>
+              <a:rPr lang="en-US"/>
+              <a:t>Developing new ones.</a:t>
+            </a:r>
             <a:endParaRPr lang="en-NZ" dirty="0"/>
           </a:p>
           <a:p>

</xml_diff>